<commit_message>
estudando orientãção a objeto
</commit_message>
<xml_diff>
--- a/Introdução.pptx
+++ b/Introdução.pptx
@@ -3413,13 +3413,13 @@
             </a:extLst>
           </p:cNvPr>
           <p:cNvCxnSpPr>
-            <a:stCxn id="12" idx="3"/>
+            <a:cxnSpLocks/>
           </p:cNvCxnSpPr>
           <p:nvPr/>
         </p:nvCxnSpPr>
         <p:spPr>
           <a:xfrm>
-            <a:off x="3091077" y="1997608"/>
+            <a:off x="3162868" y="1997608"/>
             <a:ext cx="1124767" cy="0"/>
           </a:xfrm>
           <a:prstGeom prst="straightConnector1">
@@ -6000,8 +6000,8 @@
         </p:nvSpPr>
         <p:spPr>
           <a:xfrm>
-            <a:off x="406400" y="254061"/>
-            <a:ext cx="6096000" cy="1200329"/>
+            <a:off x="5709061" y="0"/>
+            <a:ext cx="6259872" cy="1200329"/>
           </a:xfrm>
           <a:prstGeom prst="rect">
             <a:avLst/>
@@ -6074,6 +6074,279 @@
           </a:p>
         </p:txBody>
       </p:sp>
+      <p:sp>
+        <p:nvSpPr>
+          <p:cNvPr id="2" name="CaixaDeTexto 1">
+            <a:extLst>
+              <a:ext uri="{FF2B5EF4-FFF2-40B4-BE49-F238E27FC236}">
+                <a16:creationId xmlns:a16="http://schemas.microsoft.com/office/drawing/2014/main" id="{B87D4928-9458-FF93-104E-9304F7BC27AF}"/>
+              </a:ext>
+            </a:extLst>
+          </p:cNvPr>
+          <p:cNvSpPr txBox="1"/>
+          <p:nvPr/>
+        </p:nvSpPr>
+        <p:spPr>
+          <a:xfrm>
+            <a:off x="406399" y="933281"/>
+            <a:ext cx="6259872" cy="2585323"/>
+          </a:xfrm>
+          <a:prstGeom prst="rect">
+            <a:avLst/>
+          </a:prstGeom>
+          <a:noFill/>
+        </p:spPr>
+        <p:txBody>
+          <a:bodyPr wrap="square" rtlCol="0">
+            <a:spAutoFit/>
+          </a:bodyPr>
+          <a:lstStyle/>
+          <a:p>
+            <a:r>
+              <a:rPr lang="pt-BR" dirty="0">
+                <a:solidFill>
+                  <a:schemeClr val="bg1"/>
+                </a:solidFill>
+              </a:rPr>
+              <a:t>Classe é descrita por objetos,</a:t>
+            </a:r>
+          </a:p>
+          <a:p>
+            <a:endParaRPr lang="pt-BR" b="1" dirty="0">
+              <a:solidFill>
+                <a:schemeClr val="bg1"/>
+              </a:solidFill>
+            </a:endParaRPr>
+          </a:p>
+          <a:p>
+            <a:r>
+              <a:rPr lang="pt-BR" b="1" dirty="0">
+                <a:solidFill>
+                  <a:schemeClr val="bg1"/>
+                </a:solidFill>
+              </a:rPr>
+              <a:t>METODOS</a:t>
+            </a:r>
+          </a:p>
+          <a:p>
+            <a:r>
+              <a:rPr lang="pt-BR" dirty="0">
+                <a:solidFill>
+                  <a:schemeClr val="bg1"/>
+                </a:solidFill>
+              </a:rPr>
+              <a:t>*Métodos são construídos para retornar </a:t>
+            </a:r>
+            <a:r>
+              <a:rPr lang="pt-BR" b="1" dirty="0" err="1">
+                <a:solidFill>
+                  <a:srgbClr val="B009C7"/>
+                </a:solidFill>
+              </a:rPr>
+              <a:t>return</a:t>
+            </a:r>
+            <a:r>
+              <a:rPr lang="pt-BR" dirty="0">
+                <a:solidFill>
+                  <a:schemeClr val="bg1"/>
+                </a:solidFill>
+              </a:rPr>
+              <a:t> valores</a:t>
+            </a:r>
+          </a:p>
+          <a:p>
+            <a:r>
+              <a:rPr lang="pt-BR" dirty="0">
+                <a:solidFill>
+                  <a:schemeClr val="bg1"/>
+                </a:solidFill>
+              </a:rPr>
+              <a:t>*Construindo um método, método é uma função!</a:t>
+            </a:r>
+          </a:p>
+          <a:p>
+            <a:endParaRPr lang="pt-BR" b="1" dirty="0">
+              <a:solidFill>
+                <a:schemeClr val="bg1"/>
+              </a:solidFill>
+            </a:endParaRPr>
+          </a:p>
+          <a:p>
+            <a:r>
+              <a:rPr lang="pt-BR" b="1" dirty="0">
+                <a:solidFill>
+                  <a:schemeClr val="bg1"/>
+                </a:solidFill>
+              </a:rPr>
+              <a:t>CLASS</a:t>
+            </a:r>
+          </a:p>
+          <a:p>
+            <a:r>
+              <a:rPr lang="pt-BR" dirty="0">
+                <a:solidFill>
+                  <a:schemeClr val="bg1"/>
+                </a:solidFill>
+              </a:rPr>
+              <a:t>Ou seja uma função dentro de uma classe é chamada de método</a:t>
+            </a:r>
+          </a:p>
+          <a:p>
+            <a:endParaRPr lang="pt-BR" dirty="0">
+              <a:solidFill>
+                <a:schemeClr val="bg1"/>
+              </a:solidFill>
+            </a:endParaRPr>
+          </a:p>
+        </p:txBody>
+      </p:sp>
+      <p:pic>
+        <p:nvPicPr>
+          <p:cNvPr id="1026" name="Picture 2" descr="Imagem com dois retângulos lado a lado. O primeiro representa uma classe, apenas contorno do desenho de um carro; o segundo representa um objeto, com três carros desenhados.">
+            <a:extLst>
+              <a:ext uri="{FF2B5EF4-FFF2-40B4-BE49-F238E27FC236}">
+                <a16:creationId xmlns:a16="http://schemas.microsoft.com/office/drawing/2014/main" id="{80A10F26-3189-9892-1E61-2460EF884F01}"/>
+              </a:ext>
+            </a:extLst>
+          </p:cNvPr>
+          <p:cNvPicPr>
+            <a:picLocks noChangeAspect="1" noChangeArrowheads="1"/>
+          </p:cNvPicPr>
+          <p:nvPr/>
+        </p:nvPicPr>
+        <p:blipFill>
+          <a:blip r:embed="rId3">
+            <a:extLst>
+              <a:ext uri="{28A0092B-C50C-407E-A947-70E740481C1C}">
+                <a14:useLocalDpi xmlns:a14="http://schemas.microsoft.com/office/drawing/2010/main" val="0"/>
+              </a:ext>
+            </a:extLst>
+          </a:blip>
+          <a:srcRect/>
+          <a:stretch>
+            <a:fillRect/>
+          </a:stretch>
+        </p:blipFill>
+        <p:spPr bwMode="auto">
+          <a:xfrm>
+            <a:off x="189804" y="3687097"/>
+            <a:ext cx="3413197" cy="2389238"/>
+          </a:xfrm>
+          <a:prstGeom prst="rect">
+            <a:avLst/>
+          </a:prstGeom>
+          <a:noFill/>
+          <a:extLst>
+            <a:ext uri="{909E8E84-426E-40DD-AFC4-6F175D3DCCD1}">
+              <a14:hiddenFill xmlns:a14="http://schemas.microsoft.com/office/drawing/2010/main">
+                <a:solidFill>
+                  <a:srgbClr val="FFFFFF"/>
+                </a:solidFill>
+              </a14:hiddenFill>
+            </a:ext>
+          </a:extLst>
+        </p:spPr>
+      </p:pic>
+      <p:sp>
+        <p:nvSpPr>
+          <p:cNvPr id="3" name="CaixaDeTexto 2">
+            <a:hlinkClick r:id="rId4"/>
+            <a:extLst>
+              <a:ext uri="{FF2B5EF4-FFF2-40B4-BE49-F238E27FC236}">
+                <a16:creationId xmlns:a16="http://schemas.microsoft.com/office/drawing/2014/main" id="{20A9D32C-5980-4A87-5471-CAE9DEE74D0C}"/>
+              </a:ext>
+            </a:extLst>
+          </p:cNvPr>
+          <p:cNvSpPr txBox="1"/>
+          <p:nvPr/>
+        </p:nvSpPr>
+        <p:spPr>
+          <a:xfrm>
+            <a:off x="406399" y="324465"/>
+            <a:ext cx="2061498" cy="523220"/>
+          </a:xfrm>
+          <a:prstGeom prst="rect">
+            <a:avLst/>
+          </a:prstGeom>
+          <a:noFill/>
+        </p:spPr>
+        <p:txBody>
+          <a:bodyPr wrap="square" rtlCol="0">
+            <a:spAutoFit/>
+          </a:bodyPr>
+          <a:lstStyle/>
+          <a:p>
+            <a:r>
+              <a:rPr lang="pt-BR" sz="2800" b="1" u="sng" dirty="0">
+                <a:solidFill>
+                  <a:schemeClr val="bg1"/>
+                </a:solidFill>
+              </a:rPr>
+              <a:t>POO  </a:t>
+            </a:r>
+            <a:r>
+              <a:rPr lang="pt-BR" sz="1200" b="1" u="sng" dirty="0">
+                <a:solidFill>
+                  <a:schemeClr val="bg1"/>
+                </a:solidFill>
+              </a:rPr>
+              <a:t>&lt;&lt; link</a:t>
+            </a:r>
+            <a:endParaRPr lang="pt-BR" sz="2800" b="1" u="sng" dirty="0">
+              <a:solidFill>
+                <a:schemeClr val="bg1"/>
+              </a:solidFill>
+            </a:endParaRPr>
+          </a:p>
+        </p:txBody>
+      </p:sp>
+      <p:pic>
+        <p:nvPicPr>
+          <p:cNvPr id="1028" name="Picture 4" descr="Desenho de um carro, representando a classe &quot;carro&quot;, com os métodos e atributos da classe escritos dentro do desenho">
+            <a:extLst>
+              <a:ext uri="{FF2B5EF4-FFF2-40B4-BE49-F238E27FC236}">
+                <a16:creationId xmlns:a16="http://schemas.microsoft.com/office/drawing/2014/main" id="{8E1A4D8E-D3EF-AB9B-9E4C-5C9F07E504F2}"/>
+              </a:ext>
+            </a:extLst>
+          </p:cNvPr>
+          <p:cNvPicPr>
+            <a:picLocks noChangeAspect="1" noChangeArrowheads="1"/>
+          </p:cNvPicPr>
+          <p:nvPr/>
+        </p:nvPicPr>
+        <p:blipFill>
+          <a:blip r:embed="rId5">
+            <a:extLst>
+              <a:ext uri="{28A0092B-C50C-407E-A947-70E740481C1C}">
+                <a14:useLocalDpi xmlns:a14="http://schemas.microsoft.com/office/drawing/2010/main" val="0"/>
+              </a:ext>
+            </a:extLst>
+          </a:blip>
+          <a:srcRect/>
+          <a:stretch>
+            <a:fillRect/>
+          </a:stretch>
+        </p:blipFill>
+        <p:spPr bwMode="auto">
+          <a:xfrm>
+            <a:off x="3759816" y="3348818"/>
+            <a:ext cx="3898489" cy="3099299"/>
+          </a:xfrm>
+          <a:prstGeom prst="rect">
+            <a:avLst/>
+          </a:prstGeom>
+          <a:noFill/>
+          <a:extLst>
+            <a:ext uri="{909E8E84-426E-40DD-AFC4-6F175D3DCCD1}">
+              <a14:hiddenFill xmlns:a14="http://schemas.microsoft.com/office/drawing/2010/main">
+                <a:solidFill>
+                  <a:srgbClr val="FFFFFF"/>
+                </a:solidFill>
+              </a14:hiddenFill>
+            </a:ext>
+          </a:extLst>
+        </p:spPr>
+      </p:pic>
     </p:spTree>
     <p:extLst>
       <p:ext uri="{BB962C8B-B14F-4D97-AF65-F5344CB8AC3E}">

</xml_diff>